<commit_message>
Regenerate presentations using latest binary
</commit_message>
<xml_diff>
--- a/src/examples/chart_types/chart_types.pptx
+++ b/src/examples/chart_types/chart_types.pptx
@@ -2,10 +2,10 @@
 <file path=ppt/presentation.xml><?xml version="1.0" encoding="utf-8"?>
 <p:presentation xmlns:p="http://schemas.openxmlformats.org/presentationml/2006/main" showSpecialPlsOnTitleSld="0">
   <p:sldMasterIdLst>
-    <p:sldMasterId xmlns:r="http://schemas.openxmlformats.org/officeDocument/2006/relationships" id="2147483648" r:id="R961eb7308bc24cca"/>
+    <p:sldMasterId xmlns:r="http://schemas.openxmlformats.org/officeDocument/2006/relationships" id="2147483648" r:id="Rbdc62c044fbc45fa"/>
   </p:sldMasterIdLst>
   <p:sldIdLst>
-    <p:sldId xmlns:r="http://schemas.openxmlformats.org/officeDocument/2006/relationships" id="257" r:id="R4a3657a4e9f94e5c"/>
+    <p:sldId xmlns:r="http://schemas.openxmlformats.org/officeDocument/2006/relationships" id="257" r:id="R6161eb84cd714ad6"/>
   </p:sldIdLst>
   <p:sldSz cx="9144000" cy="6858000" type="screen4x3"/>
   <p:notesSz cx="6858000" cy="9144000"/>
@@ -47,6 +47,9 @@
             <a:off x="288000" y="288000"/>
             <a:ext cx="8568000" cy="828000"/>
           </a:xfrm>
+          <a:prstGeom xmlns:a="http://schemas.openxmlformats.org/drawingml/2006/main" prst="rect">
+            <a:avLst/>
+          </a:prstGeom>
         </p:spPr>
         <p:txBody>
           <a:bodyPr xmlns:a="http://schemas.openxmlformats.org/drawingml/2006/main">
@@ -74,6 +77,9 @@
             <a:off x="288000" y="1152000"/>
             <a:ext cx="8568000" cy="5094000"/>
           </a:xfrm>
+          <a:prstGeom xmlns:a="http://schemas.openxmlformats.org/drawingml/2006/main" prst="rect">
+            <a:avLst/>
+          </a:prstGeom>
         </p:spPr>
         <p:txBody>
           <a:bodyPr xmlns:a="http://schemas.openxmlformats.org/drawingml/2006/main">
@@ -101,6 +107,9 @@
             <a:off x="8568000" y="6282000"/>
             <a:ext cx="288000" cy="288000"/>
           </a:xfrm>
+          <a:prstGeom xmlns:a="http://schemas.openxmlformats.org/drawingml/2006/main" prst="rect">
+            <a:avLst/>
+          </a:prstGeom>
         </p:spPr>
         <p:txBody>
           <a:bodyPr xmlns:a="http://schemas.openxmlformats.org/drawingml/2006/main" wrap="none"/>
@@ -110,7 +119,7 @@
             </a:lvl1pPr>
           </a:lstStyle>
           <a:p xmlns:a="http://schemas.openxmlformats.org/drawingml/2006/main">
-            <a:fld id="{E0B7C43B-7485-4004-9A5C-5150D15D43B8}" type="slidenum">
+            <a:fld id="{FB6922FE-0281-47F0-82D0-F16E26663D14}" type="slidenum">
               <a:t>‹#›</a:t>
             </a:fld>
           </a:p>
@@ -155,6 +164,9 @@
             <a:off x="288000" y="288000"/>
             <a:ext cx="8568000" cy="828000"/>
           </a:xfrm>
+          <a:prstGeom xmlns:a="http://schemas.openxmlformats.org/drawingml/2006/main" prst="rect">
+            <a:avLst/>
+          </a:prstGeom>
         </p:spPr>
         <p:txBody>
           <a:bodyPr xmlns:a="http://schemas.openxmlformats.org/drawingml/2006/main">
@@ -182,6 +194,9 @@
             <a:off x="288000" y="1152000"/>
             <a:ext cx="8568000" cy="5094000"/>
           </a:xfrm>
+          <a:prstGeom xmlns:a="http://schemas.openxmlformats.org/drawingml/2006/main" prst="rect">
+            <a:avLst/>
+          </a:prstGeom>
         </p:spPr>
         <p:txBody>
           <a:bodyPr xmlns:a="http://schemas.openxmlformats.org/drawingml/2006/main">
@@ -209,6 +224,9 @@
             <a:off x="8568000" y="6282000"/>
             <a:ext cx="288000" cy="288000"/>
           </a:xfrm>
+          <a:prstGeom xmlns:a="http://schemas.openxmlformats.org/drawingml/2006/main" prst="rect">
+            <a:avLst/>
+          </a:prstGeom>
         </p:spPr>
         <p:txBody>
           <a:bodyPr xmlns:a="http://schemas.openxmlformats.org/drawingml/2006/main" wrap="none"/>
@@ -218,7 +236,7 @@
             </a:lvl1pPr>
           </a:lstStyle>
           <a:p xmlns:a="http://schemas.openxmlformats.org/drawingml/2006/main">
-            <a:fld id="{E0B7C43B-7485-4004-9A5C-5150D15D43B8}" type="slidenum">
+            <a:fld id="{FB6922FE-0281-47F0-82D0-F16E26663D14}" type="slidenum">
               <a:t>‹#›</a:t>
             </a:fld>
           </a:p>
@@ -228,7 +246,7 @@
   </p:cSld>
   <p:clrMap bg1="lt1" tx1="dk1" bg2="lt2" tx2="dk2" accent1="accent1" accent2="accent2" accent3="accent3" accent4="accent4" accent5="accent5" accent6="accent6" hlink="hlink" folHlink="folHlink"/>
   <p:sldLayoutIdLst>
-    <p:sldLayoutId xmlns:r="http://schemas.openxmlformats.org/officeDocument/2006/relationships" id="2147483650" r:id="R18d10c89d23640a5"/>
+    <p:sldLayoutId xmlns:r="http://schemas.openxmlformats.org/officeDocument/2006/relationships" id="2147483650" r:id="Ref83f6c422734ed0"/>
   </p:sldLayoutIdLst>
   <p:txStyles>
     <p:titleStyle>
@@ -633,7 +651,7 @@
       </c:txPr>
     </c:legend>
   </c:chart>
-  <c:externalData xmlns:r="http://schemas.openxmlformats.org/officeDocument/2006/relationships" r:id="Redb850be775a4087"/>
+  <c:externalData xmlns:r="http://schemas.openxmlformats.org/officeDocument/2006/relationships" r:id="Ra8ec15a819da43bb"/>
 </c:chartSpace>
 </file>
 
@@ -1030,7 +1048,7 @@
       </c:txPr>
     </c:legend>
   </c:chart>
-  <c:externalData xmlns:r="http://schemas.openxmlformats.org/officeDocument/2006/relationships" r:id="R8c7604102a09496f"/>
+  <c:externalData xmlns:r="http://schemas.openxmlformats.org/officeDocument/2006/relationships" r:id="R41561e2877354c9a"/>
 </c:chartSpace>
 </file>
 
@@ -1378,7 +1396,7 @@
       </c:txPr>
     </c:legend>
   </c:chart>
-  <c:externalData xmlns:r="http://schemas.openxmlformats.org/officeDocument/2006/relationships" r:id="R718599796fac4bf8"/>
+  <c:externalData xmlns:r="http://schemas.openxmlformats.org/officeDocument/2006/relationships" r:id="R900dd35ae0e9418b"/>
 </c:chartSpace>
 </file>
 
@@ -2155,7 +2173,7 @@
       </c:valAx>
     </c:plotArea>
   </c:chart>
-  <c:externalData xmlns:r="http://schemas.openxmlformats.org/officeDocument/2006/relationships" r:id="R9b1b76e1c37744d9"/>
+  <c:externalData xmlns:r="http://schemas.openxmlformats.org/officeDocument/2006/relationships" r:id="R795c870cc96d488f"/>
 </c:chartSpace>
 </file>
 
@@ -2374,7 +2392,7 @@
       </c:valAx>
     </c:plotArea>
   </c:chart>
-  <c:externalData xmlns:r="http://schemas.openxmlformats.org/officeDocument/2006/relationships" r:id="Rb7677191e85a4658"/>
+  <c:externalData xmlns:r="http://schemas.openxmlformats.org/officeDocument/2006/relationships" r:id="R62eb8b27abad4d4e"/>
 </c:chartSpace>
 </file>
 
@@ -2687,7 +2705,7 @@
       </c:txPr>
     </c:legend>
   </c:chart>
-  <c:externalData xmlns:r="http://schemas.openxmlformats.org/officeDocument/2006/relationships" r:id="Rca643148e1ba4ba2"/>
+  <c:externalData xmlns:r="http://schemas.openxmlformats.org/officeDocument/2006/relationships" r:id="R15bc802c9c4149e4"/>
 </c:chartSpace>
 </file>
 
@@ -2725,6 +2743,9 @@
             <a:off x="288000" y="288000"/>
             <a:ext cx="8568000" cy="828000"/>
           </a:xfrm>
+          <a:prstGeom xmlns:a="http://schemas.openxmlformats.org/drawingml/2006/main" prst="rect">
+            <a:avLst/>
+          </a:prstGeom>
         </p:spPr>
         <p:txBody>
           <a:bodyPr xmlns:a="http://schemas.openxmlformats.org/drawingml/2006/main">
@@ -2755,6 +2776,9 @@
             <a:off x="8568000" y="6282000"/>
             <a:ext cx="288000" cy="288000"/>
           </a:xfrm>
+          <a:prstGeom xmlns:a="http://schemas.openxmlformats.org/drawingml/2006/main" prst="rect">
+            <a:avLst/>
+          </a:prstGeom>
         </p:spPr>
         <p:txBody>
           <a:bodyPr xmlns:a="http://schemas.openxmlformats.org/drawingml/2006/main" wrap="none"/>
@@ -2764,7 +2788,7 @@
             </a:lvl1pPr>
           </a:lstStyle>
           <a:p xmlns:a="http://schemas.openxmlformats.org/drawingml/2006/main">
-            <a:fld id="{E0B7C43B-7485-4004-9A5C-5150D15D43B8}" type="slidenum">
+            <a:fld id="{FB6922FE-0281-47F0-82D0-F16E26663D14}" type="slidenum">
               <a:t>‹#›</a:t>
             </a:fld>
           </a:p>
@@ -2784,7 +2808,7 @@
         </p:xfrm>
         <a:graphic xmlns:a="http://schemas.openxmlformats.org/drawingml/2006/main">
           <a:graphicData uri="http://schemas.openxmlformats.org/drawingml/2006/chart">
-            <c:chart xmlns:r="http://schemas.openxmlformats.org/officeDocument/2006/relationships" xmlns:c="http://schemas.openxmlformats.org/drawingml/2006/chart" r:id="R31752f2ce8af4018"/>
+            <c:chart xmlns:r="http://schemas.openxmlformats.org/officeDocument/2006/relationships" xmlns:c="http://schemas.openxmlformats.org/drawingml/2006/chart" r:id="Re362a7695b494306"/>
           </a:graphicData>
         </a:graphic>
       </p:graphicFrame>
@@ -2802,7 +2826,7 @@
         </p:xfrm>
         <a:graphic xmlns:a="http://schemas.openxmlformats.org/drawingml/2006/main">
           <a:graphicData uri="http://schemas.openxmlformats.org/drawingml/2006/chart">
-            <c:chart xmlns:r="http://schemas.openxmlformats.org/officeDocument/2006/relationships" xmlns:c="http://schemas.openxmlformats.org/drawingml/2006/chart" r:id="R1095e7a2406c4970"/>
+            <c:chart xmlns:r="http://schemas.openxmlformats.org/officeDocument/2006/relationships" xmlns:c="http://schemas.openxmlformats.org/drawingml/2006/chart" r:id="Ra8528dcbf47449f3"/>
           </a:graphicData>
         </a:graphic>
       </p:graphicFrame>
@@ -2820,7 +2844,7 @@
         </p:xfrm>
         <a:graphic xmlns:a="http://schemas.openxmlformats.org/drawingml/2006/main">
           <a:graphicData uri="http://schemas.openxmlformats.org/drawingml/2006/chart">
-            <c:chart xmlns:r="http://schemas.openxmlformats.org/officeDocument/2006/relationships" xmlns:c="http://schemas.openxmlformats.org/drawingml/2006/chart" r:id="Rd507a27c1a2e477d"/>
+            <c:chart xmlns:r="http://schemas.openxmlformats.org/officeDocument/2006/relationships" xmlns:c="http://schemas.openxmlformats.org/drawingml/2006/chart" r:id="Rb65f40d6255043ee"/>
           </a:graphicData>
         </a:graphic>
       </p:graphicFrame>
@@ -2838,7 +2862,7 @@
         </p:xfrm>
         <a:graphic xmlns:a="http://schemas.openxmlformats.org/drawingml/2006/main">
           <a:graphicData uri="http://schemas.openxmlformats.org/drawingml/2006/chart">
-            <c:chart xmlns:r="http://schemas.openxmlformats.org/officeDocument/2006/relationships" xmlns:c="http://schemas.openxmlformats.org/drawingml/2006/chart" r:id="R040956aa7a584bec"/>
+            <c:chart xmlns:r="http://schemas.openxmlformats.org/officeDocument/2006/relationships" xmlns:c="http://schemas.openxmlformats.org/drawingml/2006/chart" r:id="R82bc283afa274110"/>
           </a:graphicData>
         </a:graphic>
       </p:graphicFrame>
@@ -2856,7 +2880,7 @@
         </p:xfrm>
         <a:graphic xmlns:a="http://schemas.openxmlformats.org/drawingml/2006/main">
           <a:graphicData uri="http://schemas.openxmlformats.org/drawingml/2006/chart">
-            <c:chart xmlns:r="http://schemas.openxmlformats.org/officeDocument/2006/relationships" xmlns:c="http://schemas.openxmlformats.org/drawingml/2006/chart" r:id="R5024c7d064354171"/>
+            <c:chart xmlns:r="http://schemas.openxmlformats.org/officeDocument/2006/relationships" xmlns:c="http://schemas.openxmlformats.org/drawingml/2006/chart" r:id="R2d2b9ce62bbc4968"/>
           </a:graphicData>
         </a:graphic>
       </p:graphicFrame>
@@ -2874,7 +2898,7 @@
         </p:xfrm>
         <a:graphic xmlns:a="http://schemas.openxmlformats.org/drawingml/2006/main">
           <a:graphicData uri="http://schemas.openxmlformats.org/drawingml/2006/chart">
-            <c:chart xmlns:r="http://schemas.openxmlformats.org/officeDocument/2006/relationships" xmlns:c="http://schemas.openxmlformats.org/drawingml/2006/chart" r:id="R42eeffa1add641a6"/>
+            <c:chart xmlns:r="http://schemas.openxmlformats.org/officeDocument/2006/relationships" xmlns:c="http://schemas.openxmlformats.org/drawingml/2006/chart" r:id="R34eea21d21bc4a4b"/>
           </a:graphicData>
         </a:graphic>
       </p:graphicFrame>

</xml_diff>

<commit_message>
Migrate to .NET 10
</commit_message>
<xml_diff>
--- a/src/examples/chart_types/chart_types.pptx
+++ b/src/examples/chart_types/chart_types.pptx
@@ -2,10 +2,10 @@
 <file path=ppt/presentation.xml><?xml version="1.0" encoding="utf-8"?>
 <p:presentation xmlns:p="http://schemas.openxmlformats.org/presentationml/2006/main" showSpecialPlsOnTitleSld="0">
   <p:sldMasterIdLst>
-    <p:sldMasterId xmlns:r="http://schemas.openxmlformats.org/officeDocument/2006/relationships" id="2147483648" r:id="Rbdc62c044fbc45fa"/>
+    <p:sldMasterId xmlns:r="http://schemas.openxmlformats.org/officeDocument/2006/relationships" id="2147483648" r:id="R2ea4f2fe189845b2"/>
   </p:sldMasterIdLst>
   <p:sldIdLst>
-    <p:sldId xmlns:r="http://schemas.openxmlformats.org/officeDocument/2006/relationships" id="257" r:id="R6161eb84cd714ad6"/>
+    <p:sldId xmlns:r="http://schemas.openxmlformats.org/officeDocument/2006/relationships" id="257" r:id="R044d6e129dac4230"/>
   </p:sldIdLst>
   <p:sldSz cx="9144000" cy="6858000" type="screen4x3"/>
   <p:notesSz cx="6858000" cy="9144000"/>
@@ -119,7 +119,7 @@
             </a:lvl1pPr>
           </a:lstStyle>
           <a:p xmlns:a="http://schemas.openxmlformats.org/drawingml/2006/main">
-            <a:fld id="{FB6922FE-0281-47F0-82D0-F16E26663D14}" type="slidenum">
+            <a:fld id="{DCCD6FBB-2A5D-4E5D-98D5-385EB2418A52}" type="slidenum">
               <a:t>‹#›</a:t>
             </a:fld>
           </a:p>
@@ -236,7 +236,7 @@
             </a:lvl1pPr>
           </a:lstStyle>
           <a:p xmlns:a="http://schemas.openxmlformats.org/drawingml/2006/main">
-            <a:fld id="{FB6922FE-0281-47F0-82D0-F16E26663D14}" type="slidenum">
+            <a:fld id="{DCCD6FBB-2A5D-4E5D-98D5-385EB2418A52}" type="slidenum">
               <a:t>‹#›</a:t>
             </a:fld>
           </a:p>
@@ -246,19 +246,19 @@
   </p:cSld>
   <p:clrMap bg1="lt1" tx1="dk1" bg2="lt2" tx2="dk2" accent1="accent1" accent2="accent2" accent3="accent3" accent4="accent4" accent5="accent5" accent6="accent6" hlink="hlink" folHlink="folHlink"/>
   <p:sldLayoutIdLst>
-    <p:sldLayoutId xmlns:r="http://schemas.openxmlformats.org/officeDocument/2006/relationships" id="2147483650" r:id="Ref83f6c422734ed0"/>
+    <p:sldLayoutId xmlns:r="http://schemas.openxmlformats.org/officeDocument/2006/relationships" id="2147483650" r:id="R89f5379eab324fe0"/>
   </p:sldLayoutIdLst>
   <p:txStyles>
     <p:titleStyle>
       <a:defPPr xmlns:a="http://schemas.openxmlformats.org/drawingml/2006/main">
-        <a:defRPr lang="ja-JP" altLang="en-US">
+        <a:defRPr lang="en-US" altLang="en-US">
           <a:solidFill>
             <a:schemeClr val="dk1"/>
           </a:solidFill>
         </a:defRPr>
       </a:defPPr>
       <a:lvl1pPr xmlns:a="http://schemas.openxmlformats.org/drawingml/2006/main">
-        <a:defRPr lang="ja-JP" altLang="en-US" sz="4400">
+        <a:defRPr lang="en-US" altLang="en-US" sz="4400">
           <a:solidFill>
             <a:schemeClr val="dk1"/>
           </a:solidFill>
@@ -270,7 +270,7 @@
     </p:titleStyle>
     <p:bodyStyle>
       <a:defPPr xmlns:a="http://schemas.openxmlformats.org/drawingml/2006/main">
-        <a:defRPr lang="ja-JP" altLang="en-US">
+        <a:defRPr lang="en-US" altLang="en-US">
           <a:solidFill>
             <a:schemeClr val="dk1"/>
           </a:solidFill>
@@ -278,7 +278,7 @@
       </a:defPPr>
       <a:lvl1pPr xmlns:a="http://schemas.openxmlformats.org/drawingml/2006/main" marL="355600" indent="-355600">
         <a:buChar char="•"/>
-        <a:defRPr lang="ja-JP" altLang="en-US" sz="2800">
+        <a:defRPr lang="en-US" altLang="en-US" sz="2800">
           <a:solidFill>
             <a:schemeClr val="dk1"/>
           </a:solidFill>
@@ -289,7 +289,7 @@
       </a:lvl1pPr>
       <a:lvl2pPr xmlns:a="http://schemas.openxmlformats.org/drawingml/2006/main" marL="660400" indent="-304800">
         <a:buChar char="⁃"/>
-        <a:defRPr lang="ja-JP" altLang="en-US" sz="2400">
+        <a:defRPr lang="en-US" altLang="en-US" sz="2400">
           <a:solidFill>
             <a:schemeClr val="dk1"/>
           </a:solidFill>
@@ -300,7 +300,7 @@
       </a:lvl2pPr>
       <a:lvl3pPr xmlns:a="http://schemas.openxmlformats.org/drawingml/2006/main" marL="914400" indent="-254000">
         <a:buChar char="*"/>
-        <a:defRPr lang="ja-JP" altLang="en-US" sz="2000">
+        <a:defRPr lang="en-US" altLang="en-US" sz="2000">
           <a:solidFill>
             <a:schemeClr val="dk1"/>
           </a:solidFill>
@@ -311,7 +311,7 @@
       </a:lvl3pPr>
       <a:lvl4pPr xmlns:a="http://schemas.openxmlformats.org/drawingml/2006/main" marL="1143000" indent="-228600">
         <a:buChar char="‣"/>
-        <a:defRPr lang="ja-JP" altLang="en-US" sz="1800">
+        <a:defRPr lang="en-US" altLang="en-US" sz="1800">
           <a:solidFill>
             <a:schemeClr val="dk1"/>
           </a:solidFill>
@@ -322,7 +322,7 @@
       </a:lvl4pPr>
       <a:lvl5pPr xmlns:a="http://schemas.openxmlformats.org/drawingml/2006/main" marL="1371600" indent="-228600">
         <a:buChar char="○"/>
-        <a:defRPr lang="ja-JP" altLang="en-US" sz="1800">
+        <a:defRPr lang="en-US" altLang="en-US" sz="1800">
           <a:solidFill>
             <a:schemeClr val="dk1"/>
           </a:solidFill>
@@ -333,7 +333,7 @@
       </a:lvl5pPr>
       <a:lvl6pPr xmlns:a="http://schemas.openxmlformats.org/drawingml/2006/main" marL="1600200" indent="-228600">
         <a:buChar char="○"/>
-        <a:defRPr lang="ja-JP" altLang="en-US" sz="1800">
+        <a:defRPr lang="en-US" altLang="en-US" sz="1800">
           <a:solidFill>
             <a:schemeClr val="dk1"/>
           </a:solidFill>
@@ -344,7 +344,7 @@
       </a:lvl6pPr>
       <a:lvl7pPr xmlns:a="http://schemas.openxmlformats.org/drawingml/2006/main" marL="1828800" indent="-228600">
         <a:buChar char="○"/>
-        <a:defRPr lang="ja-JP" altLang="en-US" sz="1800">
+        <a:defRPr lang="en-US" altLang="en-US" sz="1800">
           <a:solidFill>
             <a:schemeClr val="dk1"/>
           </a:solidFill>
@@ -355,7 +355,7 @@
       </a:lvl7pPr>
       <a:lvl8pPr xmlns:a="http://schemas.openxmlformats.org/drawingml/2006/main" marL="2057400" indent="-228600">
         <a:buChar char="○"/>
-        <a:defRPr lang="ja-JP" altLang="en-US" sz="1800">
+        <a:defRPr lang="en-US" altLang="en-US" sz="1800">
           <a:solidFill>
             <a:schemeClr val="dk1"/>
           </a:solidFill>
@@ -366,7 +366,7 @@
       </a:lvl8pPr>
       <a:lvl9pPr xmlns:a="http://schemas.openxmlformats.org/drawingml/2006/main" marL="2286000" indent="-228600">
         <a:buChar char="○"/>
-        <a:defRPr lang="ja-JP" altLang="en-US" sz="1800">
+        <a:defRPr lang="en-US" altLang="en-US" sz="1800">
           <a:solidFill>
             <a:schemeClr val="dk1"/>
           </a:solidFill>
@@ -651,7 +651,7 @@
       </c:txPr>
     </c:legend>
   </c:chart>
-  <c:externalData xmlns:r="http://schemas.openxmlformats.org/officeDocument/2006/relationships" r:id="Ra8ec15a819da43bb"/>
+  <c:externalData xmlns:r="http://schemas.openxmlformats.org/officeDocument/2006/relationships" r:id="R7215fbe9f8db4325"/>
 </c:chartSpace>
 </file>
 
@@ -1048,7 +1048,7 @@
       </c:txPr>
     </c:legend>
   </c:chart>
-  <c:externalData xmlns:r="http://schemas.openxmlformats.org/officeDocument/2006/relationships" r:id="R41561e2877354c9a"/>
+  <c:externalData xmlns:r="http://schemas.openxmlformats.org/officeDocument/2006/relationships" r:id="Rd8c6adec6313498c"/>
 </c:chartSpace>
 </file>
 
@@ -1396,7 +1396,7 @@
       </c:txPr>
     </c:legend>
   </c:chart>
-  <c:externalData xmlns:r="http://schemas.openxmlformats.org/officeDocument/2006/relationships" r:id="R900dd35ae0e9418b"/>
+  <c:externalData xmlns:r="http://schemas.openxmlformats.org/officeDocument/2006/relationships" r:id="R280a7f47706b4a06"/>
 </c:chartSpace>
 </file>
 
@@ -2173,7 +2173,7 @@
       </c:valAx>
     </c:plotArea>
   </c:chart>
-  <c:externalData xmlns:r="http://schemas.openxmlformats.org/officeDocument/2006/relationships" r:id="R795c870cc96d488f"/>
+  <c:externalData xmlns:r="http://schemas.openxmlformats.org/officeDocument/2006/relationships" r:id="R32ac786171a04d97"/>
 </c:chartSpace>
 </file>
 
@@ -2392,7 +2392,7 @@
       </c:valAx>
     </c:plotArea>
   </c:chart>
-  <c:externalData xmlns:r="http://schemas.openxmlformats.org/officeDocument/2006/relationships" r:id="R62eb8b27abad4d4e"/>
+  <c:externalData xmlns:r="http://schemas.openxmlformats.org/officeDocument/2006/relationships" r:id="R3de7841eb84842ac"/>
 </c:chartSpace>
 </file>
 
@@ -2705,7 +2705,7 @@
       </c:txPr>
     </c:legend>
   </c:chart>
-  <c:externalData xmlns:r="http://schemas.openxmlformats.org/officeDocument/2006/relationships" r:id="R15bc802c9c4149e4"/>
+  <c:externalData xmlns:r="http://schemas.openxmlformats.org/officeDocument/2006/relationships" r:id="R0f973848d92342ab"/>
 </c:chartSpace>
 </file>
 
@@ -2788,7 +2788,7 @@
             </a:lvl1pPr>
           </a:lstStyle>
           <a:p xmlns:a="http://schemas.openxmlformats.org/drawingml/2006/main">
-            <a:fld id="{FB6922FE-0281-47F0-82D0-F16E26663D14}" type="slidenum">
+            <a:fld id="{DCCD6FBB-2A5D-4E5D-98D5-385EB2418A52}" type="slidenum">
               <a:t>‹#›</a:t>
             </a:fld>
           </a:p>
@@ -2808,7 +2808,7 @@
         </p:xfrm>
         <a:graphic xmlns:a="http://schemas.openxmlformats.org/drawingml/2006/main">
           <a:graphicData uri="http://schemas.openxmlformats.org/drawingml/2006/chart">
-            <c:chart xmlns:r="http://schemas.openxmlformats.org/officeDocument/2006/relationships" xmlns:c="http://schemas.openxmlformats.org/drawingml/2006/chart" r:id="Re362a7695b494306"/>
+            <c:chart xmlns:r="http://schemas.openxmlformats.org/officeDocument/2006/relationships" xmlns:c="http://schemas.openxmlformats.org/drawingml/2006/chart" r:id="Rfdd8438b0ad94470"/>
           </a:graphicData>
         </a:graphic>
       </p:graphicFrame>
@@ -2826,7 +2826,7 @@
         </p:xfrm>
         <a:graphic xmlns:a="http://schemas.openxmlformats.org/drawingml/2006/main">
           <a:graphicData uri="http://schemas.openxmlformats.org/drawingml/2006/chart">
-            <c:chart xmlns:r="http://schemas.openxmlformats.org/officeDocument/2006/relationships" xmlns:c="http://schemas.openxmlformats.org/drawingml/2006/chart" r:id="Ra8528dcbf47449f3"/>
+            <c:chart xmlns:r="http://schemas.openxmlformats.org/officeDocument/2006/relationships" xmlns:c="http://schemas.openxmlformats.org/drawingml/2006/chart" r:id="R62e7b5e9d87c44bd"/>
           </a:graphicData>
         </a:graphic>
       </p:graphicFrame>
@@ -2844,7 +2844,7 @@
         </p:xfrm>
         <a:graphic xmlns:a="http://schemas.openxmlformats.org/drawingml/2006/main">
           <a:graphicData uri="http://schemas.openxmlformats.org/drawingml/2006/chart">
-            <c:chart xmlns:r="http://schemas.openxmlformats.org/officeDocument/2006/relationships" xmlns:c="http://schemas.openxmlformats.org/drawingml/2006/chart" r:id="Rb65f40d6255043ee"/>
+            <c:chart xmlns:r="http://schemas.openxmlformats.org/officeDocument/2006/relationships" xmlns:c="http://schemas.openxmlformats.org/drawingml/2006/chart" r:id="Re0cf7b1973554b7e"/>
           </a:graphicData>
         </a:graphic>
       </p:graphicFrame>
@@ -2862,7 +2862,7 @@
         </p:xfrm>
         <a:graphic xmlns:a="http://schemas.openxmlformats.org/drawingml/2006/main">
           <a:graphicData uri="http://schemas.openxmlformats.org/drawingml/2006/chart">
-            <c:chart xmlns:r="http://schemas.openxmlformats.org/officeDocument/2006/relationships" xmlns:c="http://schemas.openxmlformats.org/drawingml/2006/chart" r:id="R82bc283afa274110"/>
+            <c:chart xmlns:r="http://schemas.openxmlformats.org/officeDocument/2006/relationships" xmlns:c="http://schemas.openxmlformats.org/drawingml/2006/chart" r:id="R336978d5025a4f38"/>
           </a:graphicData>
         </a:graphic>
       </p:graphicFrame>
@@ -2880,7 +2880,7 @@
         </p:xfrm>
         <a:graphic xmlns:a="http://schemas.openxmlformats.org/drawingml/2006/main">
           <a:graphicData uri="http://schemas.openxmlformats.org/drawingml/2006/chart">
-            <c:chart xmlns:r="http://schemas.openxmlformats.org/officeDocument/2006/relationships" xmlns:c="http://schemas.openxmlformats.org/drawingml/2006/chart" r:id="R2d2b9ce62bbc4968"/>
+            <c:chart xmlns:r="http://schemas.openxmlformats.org/officeDocument/2006/relationships" xmlns:c="http://schemas.openxmlformats.org/drawingml/2006/chart" r:id="Rc2ada8a5d3b74bac"/>
           </a:graphicData>
         </a:graphic>
       </p:graphicFrame>
@@ -2898,7 +2898,7 @@
         </p:xfrm>
         <a:graphic xmlns:a="http://schemas.openxmlformats.org/drawingml/2006/main">
           <a:graphicData uri="http://schemas.openxmlformats.org/drawingml/2006/chart">
-            <c:chart xmlns:r="http://schemas.openxmlformats.org/officeDocument/2006/relationships" xmlns:c="http://schemas.openxmlformats.org/drawingml/2006/chart" r:id="R34eea21d21bc4a4b"/>
+            <c:chart xmlns:r="http://schemas.openxmlformats.org/officeDocument/2006/relationships" xmlns:c="http://schemas.openxmlformats.org/drawingml/2006/chart" r:id="R135a5ab35d264f3e"/>
           </a:graphicData>
         </a:graphic>
       </p:graphicFrame>

</xml_diff>